<commit_message>
Post parameter reading commit
Will tackle outputing and stats in the next commit
</commit_message>
<xml_diff>
--- a/Additional/Presentations/20240605CodingUpdate.pptx
+++ b/Additional/Presentations/20240605CodingUpdate.pptx
@@ -9560,7 +9560,7 @@
           <a:p>
             <a:fld id="{BF5DCE9E-1BB9-422F-BD86-429B81264EA3}" type="datetimeFigureOut">
               <a:rPr lang="en-IN" smtClean="0"/>
-              <a:t>18-06-2024</a:t>
+              <a:t>26-06-2024</a:t>
             </a:fld>
             <a:endParaRPr lang="en-IN"/>
           </a:p>
@@ -10625,7 +10625,7 @@
           <a:p>
             <a:fld id="{53698918-721C-41EB-A543-DCCB4BCD4EE1}" type="datetime1">
               <a:rPr lang="en-IN" smtClean="0"/>
-              <a:t>18-06-2024</a:t>
+              <a:t>26-06-2024</a:t>
             </a:fld>
             <a:endParaRPr lang="en-IN"/>
           </a:p>
@@ -10833,7 +10833,7 @@
           <a:p>
             <a:fld id="{31EAFC2E-7CD5-46D5-9B51-90A0A777C0FB}" type="datetime1">
               <a:rPr lang="en-IN" smtClean="0"/>
-              <a:t>18-06-2024</a:t>
+              <a:t>26-06-2024</a:t>
             </a:fld>
             <a:endParaRPr lang="en-IN"/>
           </a:p>
@@ -11051,7 +11051,7 @@
           <a:p>
             <a:fld id="{21DF4EEF-F77E-4DEF-9D59-E580134A0BFF}" type="datetime1">
               <a:rPr lang="en-IN" smtClean="0"/>
-              <a:t>18-06-2024</a:t>
+              <a:t>26-06-2024</a:t>
             </a:fld>
             <a:endParaRPr lang="en-IN"/>
           </a:p>
@@ -11281,7 +11281,7 @@
           <a:p>
             <a:fld id="{B60A30DB-D3DD-4171-87BA-58EE4B4D9D99}" type="datetime1">
               <a:rPr lang="en-IN" smtClean="0"/>
-              <a:t>18-06-2024</a:t>
+              <a:t>26-06-2024</a:t>
             </a:fld>
             <a:endParaRPr lang="en-IN"/>
           </a:p>
@@ -11489,7 +11489,7 @@
           <a:p>
             <a:fld id="{8FD7C09A-ED8C-42A3-8E89-745F787EBAE6}" type="datetime1">
               <a:rPr lang="en-IN" smtClean="0"/>
-              <a:t>18-06-2024</a:t>
+              <a:t>26-06-2024</a:t>
             </a:fld>
             <a:endParaRPr lang="en-IN"/>
           </a:p>
@@ -11773,7 +11773,7 @@
           <a:p>
             <a:fld id="{080BA975-D9F0-4269-A855-55AF444CC146}" type="datetime1">
               <a:rPr lang="en-IN" smtClean="0"/>
-              <a:t>18-06-2024</a:t>
+              <a:t>26-06-2024</a:t>
             </a:fld>
             <a:endParaRPr lang="en-IN"/>
           </a:p>
@@ -12049,7 +12049,7 @@
           <a:p>
             <a:fld id="{3F2FDCAA-38F5-4F11-8B45-AFF0D48CAE37}" type="datetime1">
               <a:rPr lang="en-IN" smtClean="0"/>
-              <a:t>18-06-2024</a:t>
+              <a:t>26-06-2024</a:t>
             </a:fld>
             <a:endParaRPr lang="en-IN"/>
           </a:p>
@@ -12472,7 +12472,7 @@
           <a:p>
             <a:fld id="{E67CD80F-0809-4D91-A685-81C43EC68BD7}" type="datetime1">
               <a:rPr lang="en-IN" smtClean="0"/>
-              <a:t>18-06-2024</a:t>
+              <a:t>26-06-2024</a:t>
             </a:fld>
             <a:endParaRPr lang="en-IN"/>
           </a:p>
@@ -12622,7 +12622,7 @@
           <a:p>
             <a:fld id="{0000C283-6B90-4B55-96AC-1FEC6760B80A}" type="datetime1">
               <a:rPr lang="en-IN" smtClean="0"/>
-              <a:t>18-06-2024</a:t>
+              <a:t>26-06-2024</a:t>
             </a:fld>
             <a:endParaRPr lang="en-IN"/>
           </a:p>
@@ -12743,7 +12743,7 @@
           <a:p>
             <a:fld id="{8DBD286D-3A68-4404-983E-98E32172149A}" type="datetime1">
               <a:rPr lang="en-IN" smtClean="0"/>
-              <a:t>18-06-2024</a:t>
+              <a:t>26-06-2024</a:t>
             </a:fld>
             <a:endParaRPr lang="en-IN"/>
           </a:p>
@@ -13064,7 +13064,7 @@
           <a:p>
             <a:fld id="{856FFEC3-933E-468C-B098-6AED721D74E5}" type="datetime1">
               <a:rPr lang="en-IN" smtClean="0"/>
-              <a:t>18-06-2024</a:t>
+              <a:t>26-06-2024</a:t>
             </a:fld>
             <a:endParaRPr lang="en-IN"/>
           </a:p>
@@ -13272,7 +13272,7 @@
           <a:p>
             <a:fld id="{7E9D746C-5244-48A8-8BA7-7C87D343C067}" type="datetime1">
               <a:rPr lang="en-IN" smtClean="0"/>
-              <a:t>18-06-2024</a:t>
+              <a:t>26-06-2024</a:t>
             </a:fld>
             <a:endParaRPr lang="en-IN"/>
           </a:p>
@@ -13569,7 +13569,7 @@
           <a:p>
             <a:fld id="{16D845DA-BC95-4479-A4D1-9EC39717A5ED}" type="datetime1">
               <a:rPr lang="en-IN" smtClean="0"/>
-              <a:t>18-06-2024</a:t>
+              <a:t>26-06-2024</a:t>
             </a:fld>
             <a:endParaRPr lang="en-IN"/>
           </a:p>
@@ -13777,7 +13777,7 @@
           <a:p>
             <a:fld id="{2EF65F16-D82D-408B-ACAD-B510466CBCE0}" type="datetime1">
               <a:rPr lang="en-IN" smtClean="0"/>
-              <a:t>18-06-2024</a:t>
+              <a:t>26-06-2024</a:t>
             </a:fld>
             <a:endParaRPr lang="en-IN"/>
           </a:p>
@@ -13995,7 +13995,7 @@
           <a:p>
             <a:fld id="{C11CDA68-76E6-4C65-B5F6-9692920ACB6D}" type="datetime1">
               <a:rPr lang="en-IN" smtClean="0"/>
-              <a:t>18-06-2024</a:t>
+              <a:t>26-06-2024</a:t>
             </a:fld>
             <a:endParaRPr lang="en-IN"/>
           </a:p>
@@ -14279,7 +14279,7 @@
           <a:p>
             <a:fld id="{D09F8160-02F9-4DCC-880C-850EDD8A9CA1}" type="datetime1">
               <a:rPr lang="en-IN" smtClean="0"/>
-              <a:t>18-06-2024</a:t>
+              <a:t>26-06-2024</a:t>
             </a:fld>
             <a:endParaRPr lang="en-IN"/>
           </a:p>
@@ -14555,7 +14555,7 @@
           <a:p>
             <a:fld id="{4D0BBA01-C01E-4670-BF37-03B582907E57}" type="datetime1">
               <a:rPr lang="en-IN" smtClean="0"/>
-              <a:t>18-06-2024</a:t>
+              <a:t>26-06-2024</a:t>
             </a:fld>
             <a:endParaRPr lang="en-IN"/>
           </a:p>
@@ -14978,7 +14978,7 @@
           <a:p>
             <a:fld id="{26D88E8E-B885-451A-8404-BB0632FBBD96}" type="datetime1">
               <a:rPr lang="en-IN" smtClean="0"/>
-              <a:t>18-06-2024</a:t>
+              <a:t>26-06-2024</a:t>
             </a:fld>
             <a:endParaRPr lang="en-IN"/>
           </a:p>
@@ -15128,7 +15128,7 @@
           <a:p>
             <a:fld id="{4EAE6060-4FB4-40EE-8D4C-4B4E0D0CB350}" type="datetime1">
               <a:rPr lang="en-IN" smtClean="0"/>
-              <a:t>18-06-2024</a:t>
+              <a:t>26-06-2024</a:t>
             </a:fld>
             <a:endParaRPr lang="en-IN"/>
           </a:p>
@@ -15249,7 +15249,7 @@
           <a:p>
             <a:fld id="{5B095638-D3A4-4096-B879-8725F6D53E01}" type="datetime1">
               <a:rPr lang="en-IN" smtClean="0"/>
-              <a:t>18-06-2024</a:t>
+              <a:t>26-06-2024</a:t>
             </a:fld>
             <a:endParaRPr lang="en-IN"/>
           </a:p>
@@ -15570,7 +15570,7 @@
           <a:p>
             <a:fld id="{6FA226F2-CF21-4C2F-B5D5-FD57CB07C16F}" type="datetime1">
               <a:rPr lang="en-IN" smtClean="0"/>
-              <a:t>18-06-2024</a:t>
+              <a:t>26-06-2024</a:t>
             </a:fld>
             <a:endParaRPr lang="en-IN"/>
           </a:p>
@@ -15867,7 +15867,7 @@
           <a:p>
             <a:fld id="{B010FD39-8D27-4637-B9EB-FD987548BD96}" type="datetime1">
               <a:rPr lang="en-IN" smtClean="0"/>
-              <a:t>18-06-2024</a:t>
+              <a:t>26-06-2024</a:t>
             </a:fld>
             <a:endParaRPr lang="en-IN"/>
           </a:p>
@@ -16118,7 +16118,7 @@
           <a:p>
             <a:fld id="{70846B43-4F1B-420A-937E-3E33F87CAD33}" type="datetime1">
               <a:rPr lang="en-IN" smtClean="0"/>
-              <a:t>18-06-2024</a:t>
+              <a:t>26-06-2024</a:t>
             </a:fld>
             <a:endParaRPr lang="en-IN"/>
           </a:p>
@@ -16697,7 +16697,7 @@
           <a:p>
             <a:fld id="{42E843B1-15B6-4A09-A2AE-9AF40C4132EF}" type="datetime1">
               <a:rPr lang="en-IN" smtClean="0"/>
-              <a:t>18-06-2024</a:t>
+              <a:t>26-06-2024</a:t>
             </a:fld>
             <a:endParaRPr lang="en-IN"/>
           </a:p>

</xml_diff>